<commit_message>
Added database call information to the powerpoint
</commit_message>
<xml_diff>
--- a/presentation/beers_breweries.pptx
+++ b/presentation/beers_breweries.pptx
@@ -885,7 +885,7 @@
           <a:p>
             <a:fld id="{A1C83B3E-31F6-4D79-8B78-50A178B309BE}" type="datetimeFigureOut">
               <a:rPr lang="en-US" smtClean="0"/>
-              <a:t>1/9/2021</a:t>
+              <a:t>1/10/2021</a:t>
             </a:fld>
             <a:endParaRPr lang="en-US"/>
           </a:p>
@@ -1222,7 +1222,7 @@
           <a:p>
             <a:fld id="{A1C83B3E-31F6-4D79-8B78-50A178B309BE}" type="datetimeFigureOut">
               <a:rPr lang="en-US" smtClean="0"/>
-              <a:t>1/9/2021</a:t>
+              <a:t>1/10/2021</a:t>
             </a:fld>
             <a:endParaRPr lang="en-US"/>
           </a:p>
@@ -1418,7 +1418,7 @@
           <a:p>
             <a:fld id="{A1C83B3E-31F6-4D79-8B78-50A178B309BE}" type="datetimeFigureOut">
               <a:rPr lang="en-US" smtClean="0"/>
-              <a:t>1/9/2021</a:t>
+              <a:t>1/10/2021</a:t>
             </a:fld>
             <a:endParaRPr lang="en-US"/>
           </a:p>
@@ -1688,7 +1688,7 @@
           <a:p>
             <a:fld id="{A1C83B3E-31F6-4D79-8B78-50A178B309BE}" type="datetimeFigureOut">
               <a:rPr lang="en-US" smtClean="0"/>
-              <a:t>1/9/2021</a:t>
+              <a:t>1/10/2021</a:t>
             </a:fld>
             <a:endParaRPr lang="en-US"/>
           </a:p>
@@ -2116,7 +2116,7 @@
           <a:p>
             <a:fld id="{A1C83B3E-31F6-4D79-8B78-50A178B309BE}" type="datetimeFigureOut">
               <a:rPr lang="en-US" smtClean="0"/>
-              <a:t>1/9/2021</a:t>
+              <a:t>1/10/2021</a:t>
             </a:fld>
             <a:endParaRPr lang="en-US"/>
           </a:p>
@@ -2666,7 +2666,7 @@
           <a:p>
             <a:fld id="{A1C83B3E-31F6-4D79-8B78-50A178B309BE}" type="datetimeFigureOut">
               <a:rPr lang="en-US" smtClean="0"/>
-              <a:t>1/9/2021</a:t>
+              <a:t>1/10/2021</a:t>
             </a:fld>
             <a:endParaRPr lang="en-US"/>
           </a:p>
@@ -3456,7 +3456,7 @@
           <a:p>
             <a:fld id="{A1C83B3E-31F6-4D79-8B78-50A178B309BE}" type="datetimeFigureOut">
               <a:rPr lang="en-US" smtClean="0"/>
-              <a:t>1/9/2021</a:t>
+              <a:t>1/10/2021</a:t>
             </a:fld>
             <a:endParaRPr lang="en-US"/>
           </a:p>
@@ -3635,7 +3635,7 @@
           <a:p>
             <a:fld id="{A1C83B3E-31F6-4D79-8B78-50A178B309BE}" type="datetimeFigureOut">
               <a:rPr lang="en-US" smtClean="0"/>
-              <a:t>1/9/2021</a:t>
+              <a:t>1/10/2021</a:t>
             </a:fld>
             <a:endParaRPr lang="en-US"/>
           </a:p>
@@ -3819,7 +3819,7 @@
           <a:p>
             <a:fld id="{A1C83B3E-31F6-4D79-8B78-50A178B309BE}" type="datetimeFigureOut">
               <a:rPr lang="en-US" smtClean="0"/>
-              <a:t>1/9/2021</a:t>
+              <a:t>1/10/2021</a:t>
             </a:fld>
             <a:endParaRPr lang="en-US"/>
           </a:p>
@@ -3994,7 +3994,7 @@
           <a:p>
             <a:fld id="{A1C83B3E-31F6-4D79-8B78-50A178B309BE}" type="datetimeFigureOut">
               <a:rPr lang="en-US" smtClean="0"/>
-              <a:t>1/9/2021</a:t>
+              <a:t>1/10/2021</a:t>
             </a:fld>
             <a:endParaRPr lang="en-US"/>
           </a:p>
@@ -4244,7 +4244,7 @@
           <a:p>
             <a:fld id="{A1C83B3E-31F6-4D79-8B78-50A178B309BE}" type="datetimeFigureOut">
               <a:rPr lang="en-US" smtClean="0"/>
-              <a:t>1/9/2021</a:t>
+              <a:t>1/10/2021</a:t>
             </a:fld>
             <a:endParaRPr lang="en-US"/>
           </a:p>
@@ -4481,7 +4481,7 @@
           <a:p>
             <a:fld id="{A1C83B3E-31F6-4D79-8B78-50A178B309BE}" type="datetimeFigureOut">
               <a:rPr lang="en-US" smtClean="0"/>
-              <a:t>1/9/2021</a:t>
+              <a:t>1/10/2021</a:t>
             </a:fld>
             <a:endParaRPr lang="en-US"/>
           </a:p>
@@ -4866,7 +4866,7 @@
           <a:p>
             <a:fld id="{A1C83B3E-31F6-4D79-8B78-50A178B309BE}" type="datetimeFigureOut">
               <a:rPr lang="en-US" smtClean="0"/>
-              <a:t>1/9/2021</a:t>
+              <a:t>1/10/2021</a:t>
             </a:fld>
             <a:endParaRPr lang="en-US"/>
           </a:p>
@@ -4984,7 +4984,7 @@
           <a:p>
             <a:fld id="{A1C83B3E-31F6-4D79-8B78-50A178B309BE}" type="datetimeFigureOut">
               <a:rPr lang="en-US" smtClean="0"/>
-              <a:t>1/9/2021</a:t>
+              <a:t>1/10/2021</a:t>
             </a:fld>
             <a:endParaRPr lang="en-US"/>
           </a:p>
@@ -5079,7 +5079,7 @@
           <a:p>
             <a:fld id="{A1C83B3E-31F6-4D79-8B78-50A178B309BE}" type="datetimeFigureOut">
               <a:rPr lang="en-US" smtClean="0"/>
-              <a:t>1/9/2021</a:t>
+              <a:t>1/10/2021</a:t>
             </a:fld>
             <a:endParaRPr lang="en-US"/>
           </a:p>
@@ -5332,7 +5332,7 @@
           <a:p>
             <a:fld id="{A1C83B3E-31F6-4D79-8B78-50A178B309BE}" type="datetimeFigureOut">
               <a:rPr lang="en-US" smtClean="0"/>
-              <a:t>1/9/2021</a:t>
+              <a:t>1/10/2021</a:t>
             </a:fld>
             <a:endParaRPr lang="en-US"/>
           </a:p>
@@ -5601,7 +5601,7 @@
           <a:p>
             <a:fld id="{A1C83B3E-31F6-4D79-8B78-50A178B309BE}" type="datetimeFigureOut">
               <a:rPr lang="en-US" smtClean="0"/>
-              <a:t>1/9/2021</a:t>
+              <a:t>1/10/2021</a:t>
             </a:fld>
             <a:endParaRPr lang="en-US"/>
           </a:p>
@@ -6005,7 +6005,7 @@
           <a:p>
             <a:fld id="{A1C83B3E-31F6-4D79-8B78-50A178B309BE}" type="datetimeFigureOut">
               <a:rPr lang="en-US" smtClean="0"/>
-              <a:t>1/9/2021</a:t>
+              <a:t>1/10/2021</a:t>
             </a:fld>
             <a:endParaRPr lang="en-US"/>
           </a:p>
@@ -6772,7 +6772,32 @@
           <a:bodyPr/>
           <a:lstStyle/>
           <a:p>
-            <a:endParaRPr lang="en-US"/>
+            <a:r>
+              <a:rPr lang="en-US" dirty="0"/>
+              <a:t>We used the psycopg2 library in order to call external SQL Scripts to create the Database and tables from within the </a:t>
+            </a:r>
+            <a:r>
+              <a:rPr lang="en-US" dirty="0" err="1"/>
+              <a:t>Jupyter</a:t>
+            </a:r>
+            <a:r>
+              <a:rPr lang="en-US" dirty="0"/>
+              <a:t> notebook</a:t>
+            </a:r>
+          </a:p>
+          <a:p>
+            <a:r>
+              <a:rPr lang="en-US" dirty="0"/>
+              <a:t>After creating the database and schema we utilized </a:t>
+            </a:r>
+            <a:r>
+              <a:rPr lang="en-US" dirty="0" err="1"/>
+              <a:t>sqlalchemy</a:t>
+            </a:r>
+            <a:r>
+              <a:rPr lang="en-US" dirty="0"/>
+              <a:t> and pandas to load our table and perform our query against those tables.</a:t>
+            </a:r>
           </a:p>
         </p:txBody>
       </p:sp>

</xml_diff>